<commit_message>
Atualizando slides de Contextualização
</commit_message>
<xml_diff>
--- a/PESQUISA E INOVAÇÃO.pptx
+++ b/PESQUISA E INOVAÇÃO.pptx
@@ -8460,7 +8460,7 @@
                 </a:solidFill>
                 <a:latin typeface="Abadi Extra Light" panose="020B0604020202020204" pitchFamily="34" charset="0"/>
               </a:rPr>
-              <a:t>Abaixo temos um gráfico especificando as principais causas das perdas de produtos no setor varejista:</a:t>
+              <a:t>Abaixo temos um gráfico especificando as principais causas das perdas de produtos no setor supermercadista:</a:t>
             </a:r>
           </a:p>
           <a:p>
@@ -8474,42 +8474,6 @@
           </a:p>
         </p:txBody>
       </p:sp>
-      <p:pic>
-        <p:nvPicPr>
-          <p:cNvPr id="10" name="Imagem 9" descr="Gráfico, Gráfico de cascata&#10;&#10;Descrição gerada automaticamente">
-            <a:extLst>
-              <a:ext uri="{FF2B5EF4-FFF2-40B4-BE49-F238E27FC236}">
-                <a16:creationId xmlns:a16="http://schemas.microsoft.com/office/drawing/2014/main" id="{E1191551-26F1-4ED9-BE05-BDE3B94D2275}"/>
-              </a:ext>
-            </a:extLst>
-          </p:cNvPr>
-          <p:cNvPicPr>
-            <a:picLocks noChangeAspect="1"/>
-          </p:cNvPicPr>
-          <p:nvPr/>
-        </p:nvPicPr>
-        <p:blipFill>
-          <a:blip r:embed="rId3">
-            <a:extLst>
-              <a:ext uri="{28A0092B-C50C-407E-A947-70E740481C1C}">
-                <a14:useLocalDpi xmlns:a14="http://schemas.microsoft.com/office/drawing/2010/main" val="0"/>
-              </a:ext>
-            </a:extLst>
-          </a:blip>
-          <a:stretch>
-            <a:fillRect/>
-          </a:stretch>
-        </p:blipFill>
-        <p:spPr>
-          <a:xfrm>
-            <a:off x="2593596" y="1668870"/>
-            <a:ext cx="7004808" cy="4114460"/>
-          </a:xfrm>
-          <a:prstGeom prst="rect">
-            <a:avLst/>
-          </a:prstGeom>
-        </p:spPr>
-      </p:pic>
       <p:sp>
         <p:nvSpPr>
           <p:cNvPr id="4" name="CaixaDeTexto 3">
@@ -8525,7 +8489,7 @@
         <p:spPr>
           <a:xfrm>
             <a:off x="3662388" y="5967887"/>
-            <a:ext cx="5011828" cy="523220"/>
+            <a:ext cx="5011828" cy="307777"/>
           </a:xfrm>
           <a:prstGeom prst="rect">
             <a:avLst/>
@@ -8548,11 +8512,47 @@
                 <a:ea typeface="+mj-ea"/>
                 <a:cs typeface="+mj-cs"/>
               </a:rPr>
-              <a:t>Pesquisa ABRAPPE de Perdas no Varejo Brasileiro: Resultados 2019</a:t>
+              <a:t>Pesquisa ABRAPPE de Perdas no Varejo Brasileiro: Resultado 2020</a:t>
             </a:r>
           </a:p>
         </p:txBody>
       </p:sp>
+      <p:pic>
+        <p:nvPicPr>
+          <p:cNvPr id="7" name="Imagem 6" descr="Gráfico, Gráfico de cascata&#10;&#10;Descrição gerada automaticamente">
+            <a:extLst>
+              <a:ext uri="{FF2B5EF4-FFF2-40B4-BE49-F238E27FC236}">
+                <a16:creationId xmlns:a16="http://schemas.microsoft.com/office/drawing/2014/main" id="{0FA44B0C-91AF-43A5-944E-64CDBE82DEE8}"/>
+              </a:ext>
+            </a:extLst>
+          </p:cNvPr>
+          <p:cNvPicPr>
+            <a:picLocks noChangeAspect="1"/>
+          </p:cNvPicPr>
+          <p:nvPr/>
+        </p:nvPicPr>
+        <p:blipFill>
+          <a:blip r:embed="rId3">
+            <a:extLst>
+              <a:ext uri="{28A0092B-C50C-407E-A947-70E740481C1C}">
+                <a14:useLocalDpi xmlns:a14="http://schemas.microsoft.com/office/drawing/2010/main" val="0"/>
+              </a:ext>
+            </a:extLst>
+          </a:blip>
+          <a:stretch>
+            <a:fillRect/>
+          </a:stretch>
+        </p:blipFill>
+        <p:spPr>
+          <a:xfrm>
+            <a:off x="2423772" y="1686329"/>
+            <a:ext cx="7344455" cy="4165237"/>
+          </a:xfrm>
+          <a:prstGeom prst="rect">
+            <a:avLst/>
+          </a:prstGeom>
+        </p:spPr>
+      </p:pic>
     </p:spTree>
     <p:extLst>
       <p:ext uri="{BB962C8B-B14F-4D97-AF65-F5344CB8AC3E}">
@@ -8706,7 +8706,7 @@
                 </a:solidFill>
                 <a:latin typeface="Abadi Extra Light" panose="020B0604020202020204" pitchFamily="34" charset="0"/>
               </a:rPr>
-              <a:t>  Por fim, temos abaixo o gráfico mostrando as quebras operacionais:</a:t>
+              <a:t>Por fim, vemos abaixo o gráfico descrevendo as quebras operacionais nos supermercados:</a:t>
             </a:r>
           </a:p>
           <a:p>
@@ -8720,42 +8720,6 @@
           </a:p>
         </p:txBody>
       </p:sp>
-      <p:pic>
-        <p:nvPicPr>
-          <p:cNvPr id="8" name="Imagem 7" descr="Gráfico, Gráfico de cascata&#10;&#10;Descrição gerada automaticamente">
-            <a:extLst>
-              <a:ext uri="{FF2B5EF4-FFF2-40B4-BE49-F238E27FC236}">
-                <a16:creationId xmlns:a16="http://schemas.microsoft.com/office/drawing/2014/main" id="{2FD6A137-EA2B-4004-BB16-AC0F04B4682F}"/>
-              </a:ext>
-            </a:extLst>
-          </p:cNvPr>
-          <p:cNvPicPr>
-            <a:picLocks noChangeAspect="1"/>
-          </p:cNvPicPr>
-          <p:nvPr/>
-        </p:nvPicPr>
-        <p:blipFill>
-          <a:blip r:embed="rId3">
-            <a:extLst>
-              <a:ext uri="{28A0092B-C50C-407E-A947-70E740481C1C}">
-                <a14:useLocalDpi xmlns:a14="http://schemas.microsoft.com/office/drawing/2010/main" val="0"/>
-              </a:ext>
-            </a:extLst>
-          </a:blip>
-          <a:stretch>
-            <a:fillRect/>
-          </a:stretch>
-        </p:blipFill>
-        <p:spPr>
-          <a:xfrm>
-            <a:off x="2412607" y="1460849"/>
-            <a:ext cx="6776551" cy="4388095"/>
-          </a:xfrm>
-          <a:prstGeom prst="rect">
-            <a:avLst/>
-          </a:prstGeom>
-        </p:spPr>
-      </p:pic>
       <p:sp>
         <p:nvSpPr>
           <p:cNvPr id="9" name="CaixaDeTexto 8">
@@ -8770,8 +8734,8 @@
         </p:nvSpPr>
         <p:spPr>
           <a:xfrm>
-            <a:off x="3590086" y="5953890"/>
-            <a:ext cx="5011828" cy="523220"/>
+            <a:off x="3590085" y="5804040"/>
+            <a:ext cx="5011828" cy="307777"/>
           </a:xfrm>
           <a:prstGeom prst="rect">
             <a:avLst/>
@@ -8794,11 +8758,47 @@
                 <a:ea typeface="+mj-ea"/>
                 <a:cs typeface="+mj-cs"/>
               </a:rPr>
-              <a:t>Pesquisa ABRAPPE de Perdas no Varejo Brasileiro: Resultados 2019</a:t>
+              <a:t>Pesquisa ABRAPPE de Perdas no Varejo Brasileiro: Resultado 2020</a:t>
             </a:r>
           </a:p>
         </p:txBody>
       </p:sp>
+      <p:pic>
+        <p:nvPicPr>
+          <p:cNvPr id="10" name="Imagem 9" descr="Gráfico, Gráfico de barras&#10;&#10;Descrição gerada automaticamente">
+            <a:extLst>
+              <a:ext uri="{FF2B5EF4-FFF2-40B4-BE49-F238E27FC236}">
+                <a16:creationId xmlns:a16="http://schemas.microsoft.com/office/drawing/2014/main" id="{41921F04-F544-44DC-8733-4C57C80ACEBA}"/>
+              </a:ext>
+            </a:extLst>
+          </p:cNvPr>
+          <p:cNvPicPr>
+            <a:picLocks noChangeAspect="1"/>
+          </p:cNvPicPr>
+          <p:nvPr/>
+        </p:nvPicPr>
+        <p:blipFill>
+          <a:blip r:embed="rId3">
+            <a:extLst>
+              <a:ext uri="{28A0092B-C50C-407E-A947-70E740481C1C}">
+                <a14:useLocalDpi xmlns:a14="http://schemas.microsoft.com/office/drawing/2010/main" val="0"/>
+              </a:ext>
+            </a:extLst>
+          </a:blip>
+          <a:stretch>
+            <a:fillRect/>
+          </a:stretch>
+        </p:blipFill>
+        <p:spPr>
+          <a:xfrm>
+            <a:off x="1932785" y="1291604"/>
+            <a:ext cx="8326430" cy="4326668"/>
+          </a:xfrm>
+          <a:prstGeom prst="rect">
+            <a:avLst/>
+          </a:prstGeom>
+        </p:spPr>
+      </p:pic>
     </p:spTree>
     <p:extLst>
       <p:ext uri="{BB962C8B-B14F-4D97-AF65-F5344CB8AC3E}">

</xml_diff>